<commit_message>
table operations and remove extra slides
</commit_message>
<xml_diff>
--- a/input_2.pptx
+++ b/input_2.pptx
@@ -19,6 +19,8 @@
     <p:sldId id="266" r:id="rId14"/>
     <p:sldId id="267" r:id="rId15"/>
     <p:sldId id="268" r:id="rId16"/>
+    <p:sldId id="269" r:id="rId17"/>
+    <p:sldId id="270" r:id="rId18"/>
   </p:sldIdLst>
   <p:sldSz cx="9144000" cy="5143500"/>
   <p:notesSz cx="7559675" cy="10691812"/>
@@ -3231,7 +3233,7 @@
         <p:spPr>
           <a:xfrm>
             <a:off x="311760" y="744480"/>
-            <a:ext cx="8507160" cy="2039400"/>
+            <a:ext cx="8505720" cy="2037960"/>
           </a:xfrm>
           <a:prstGeom prst="rect">
             <a:avLst/>
@@ -3304,7 +3306,7 @@
         <p:spPr>
           <a:xfrm>
             <a:off x="311760" y="2834280"/>
-            <a:ext cx="8507160" cy="779400"/>
+            <a:ext cx="8505720" cy="777960"/>
           </a:xfrm>
           <a:prstGeom prst="rect">
             <a:avLst/>
@@ -3372,14 +3374,14 @@
       </p:grpSpPr>
       <p:sp>
         <p:nvSpPr>
-          <p:cNvPr id="92" name="CustomShape 1"/>
+          <p:cNvPr id="96" name="CustomShape 1"/>
           <p:cNvSpPr/>
           <p:nvPr/>
         </p:nvSpPr>
         <p:spPr>
           <a:xfrm>
             <a:off x="311760" y="1152360"/>
-            <a:ext cx="8507160" cy="3403080"/>
+            <a:ext cx="8505720" cy="3401640"/>
           </a:xfrm>
           <a:prstGeom prst="rect">
             <a:avLst/>
@@ -3475,14 +3477,14 @@
       </p:grpSpPr>
       <p:sp>
         <p:nvSpPr>
-          <p:cNvPr id="93" name="CustomShape 1"/>
+          <p:cNvPr id="97" name="CustomShape 1"/>
           <p:cNvSpPr/>
           <p:nvPr/>
         </p:nvSpPr>
         <p:spPr>
           <a:xfrm>
             <a:off x="311760" y="1152360"/>
-            <a:ext cx="8507160" cy="3403080"/>
+            <a:ext cx="8505720" cy="3401640"/>
           </a:xfrm>
           <a:prstGeom prst="rect">
             <a:avLst/>
@@ -3578,14 +3580,14 @@
       </p:grpSpPr>
       <p:sp>
         <p:nvSpPr>
-          <p:cNvPr id="94" name="CustomShape 1"/>
+          <p:cNvPr id="98" name="CustomShape 1"/>
           <p:cNvSpPr/>
           <p:nvPr/>
         </p:nvSpPr>
         <p:spPr>
           <a:xfrm>
             <a:off x="311760" y="1152360"/>
-            <a:ext cx="8507160" cy="3403080"/>
+            <a:ext cx="8505720" cy="3401640"/>
           </a:xfrm>
           <a:prstGeom prst="rect">
             <a:avLst/>
@@ -3681,14 +3683,14 @@
       </p:grpSpPr>
       <p:sp>
         <p:nvSpPr>
-          <p:cNvPr id="95" name="CustomShape 1"/>
+          <p:cNvPr id="99" name="CustomShape 1"/>
           <p:cNvSpPr/>
           <p:nvPr/>
         </p:nvSpPr>
         <p:spPr>
           <a:xfrm>
             <a:off x="311760" y="1152360"/>
-            <a:ext cx="8507160" cy="3403080"/>
+            <a:ext cx="8505720" cy="3401640"/>
           </a:xfrm>
           <a:prstGeom prst="rect">
             <a:avLst/>
@@ -3742,6 +3744,212 @@
           <p:childTnLst>
             <p:seq>
               <p:cTn id="26" dur="indefinite" nodeType="mainSeq"/>
+              <p:prevCondLst>
+                <p:cond delay="0" evt="onPrev">
+                  <p:tgtEl>
+                    <p:sldTgt/>
+                  </p:tgtEl>
+                </p:cond>
+              </p:prevCondLst>
+              <p:nextCondLst>
+                <p:cond delay="0" evt="onNext">
+                  <p:tgtEl>
+                    <p:sldTgt/>
+                  </p:tgtEl>
+                </p:cond>
+              </p:nextCondLst>
+            </p:seq>
+          </p:childTnLst>
+        </p:cTn>
+      </p:par>
+    </p:tnLst>
+  </p:timing>
+</p:sld>
+</file>
+
+<file path=ppt/slides/slide14.xml><?xml version="1.0" encoding="utf-8"?>
+<p:sld xmlns:a="http://schemas.openxmlformats.org/drawingml/2006/main" xmlns:p="http://schemas.openxmlformats.org/presentationml/2006/main" xmlns:r="http://schemas.openxmlformats.org/officeDocument/2006/relationships" xmlns:p14="http://schemas.microsoft.com/office/powerpoint/2010/main" xmlns:p15="http://schemas.microsoft.com/office/powerpoint/2012/main" xmlns:mc="http://schemas.openxmlformats.org/markup-compatibility/2006">
+  <p:cSld>
+    <p:spTree>
+      <p:nvGrpSpPr>
+        <p:cNvPr id="1" name=""/>
+        <p:cNvGrpSpPr/>
+        <p:nvPr/>
+      </p:nvGrpSpPr>
+      <p:grpSpPr>
+        <a:xfrm>
+          <a:off x="0" y="0"/>
+          <a:ext cx="0" cy="0"/>
+          <a:chOff x="0" y="0"/>
+          <a:chExt cx="0" cy="0"/>
+        </a:xfrm>
+      </p:grpSpPr>
+      <p:sp>
+        <p:nvSpPr>
+          <p:cNvPr id="100" name="CustomShape 1"/>
+          <p:cNvSpPr/>
+          <p:nvPr/>
+        </p:nvSpPr>
+        <p:spPr>
+          <a:xfrm>
+            <a:off x="311760" y="1152360"/>
+            <a:ext cx="8505720" cy="3401640"/>
+          </a:xfrm>
+          <a:prstGeom prst="rect">
+            <a:avLst/>
+          </a:prstGeom>
+          <a:noFill/>
+          <a:ln>
+            <a:noFill/>
+          </a:ln>
+        </p:spPr>
+        <p:style>
+          <a:lnRef idx="0"/>
+          <a:fillRef idx="0"/>
+          <a:effectRef idx="0"/>
+          <a:fontRef idx="minor"/>
+        </p:style>
+        <p:txBody>
+          <a:bodyPr lIns="90000" rIns="90000" tIns="91440" bIns="91440">
+            <a:normAutofit/>
+          </a:bodyPr>
+          <a:p>
+            <a:pPr>
+              <a:lnSpc>
+                <a:spcPct val="115000"/>
+              </a:lnSpc>
+              <a:spcAft>
+                <a:spcPts val="1199"/>
+              </a:spcAft>
+            </a:pPr>
+            <a:r>
+              <a:rPr b="0" lang="en-US" sz="1800" spc="-1" strike="noStrike">
+                <a:solidFill>
+                  <a:srgbClr val="595959"/>
+                </a:solidFill>
+                <a:latin typeface="Arial"/>
+                <a:ea typeface="Arial"/>
+              </a:rPr>
+              <a:t>+++ EXTRA_SLIDE +++</a:t>
+            </a:r>
+            <a:endParaRPr b="0" lang="en-US" sz="1800" spc="-1" strike="noStrike">
+              <a:latin typeface="Arial"/>
+            </a:endParaRPr>
+          </a:p>
+        </p:txBody>
+      </p:sp>
+    </p:spTree>
+  </p:cSld>
+  <p:timing>
+    <p:tnLst>
+      <p:par>
+        <p:cTn id="27" dur="indefinite" restart="never" nodeType="tmRoot">
+          <p:childTnLst>
+            <p:seq>
+              <p:cTn id="28" dur="indefinite" nodeType="mainSeq"/>
+              <p:prevCondLst>
+                <p:cond delay="0" evt="onPrev">
+                  <p:tgtEl>
+                    <p:sldTgt/>
+                  </p:tgtEl>
+                </p:cond>
+              </p:prevCondLst>
+              <p:nextCondLst>
+                <p:cond delay="0" evt="onNext">
+                  <p:tgtEl>
+                    <p:sldTgt/>
+                  </p:tgtEl>
+                </p:cond>
+              </p:nextCondLst>
+            </p:seq>
+          </p:childTnLst>
+        </p:cTn>
+      </p:par>
+    </p:tnLst>
+  </p:timing>
+</p:sld>
+</file>
+
+<file path=ppt/slides/slide15.xml><?xml version="1.0" encoding="utf-8"?>
+<p:sld xmlns:a="http://schemas.openxmlformats.org/drawingml/2006/main" xmlns:p="http://schemas.openxmlformats.org/presentationml/2006/main" xmlns:r="http://schemas.openxmlformats.org/officeDocument/2006/relationships" xmlns:p14="http://schemas.microsoft.com/office/powerpoint/2010/main" xmlns:p15="http://schemas.microsoft.com/office/powerpoint/2012/main" xmlns:mc="http://schemas.openxmlformats.org/markup-compatibility/2006">
+  <p:cSld>
+    <p:spTree>
+      <p:nvGrpSpPr>
+        <p:cNvPr id="1" name=""/>
+        <p:cNvGrpSpPr/>
+        <p:nvPr/>
+      </p:nvGrpSpPr>
+      <p:grpSpPr>
+        <a:xfrm>
+          <a:off x="0" y="0"/>
+          <a:ext cx="0" cy="0"/>
+          <a:chOff x="0" y="0"/>
+          <a:chExt cx="0" cy="0"/>
+        </a:xfrm>
+      </p:grpSpPr>
+      <p:sp>
+        <p:nvSpPr>
+          <p:cNvPr id="101" name="CustomShape 1"/>
+          <p:cNvSpPr/>
+          <p:nvPr/>
+        </p:nvSpPr>
+        <p:spPr>
+          <a:xfrm>
+            <a:off x="311760" y="1152360"/>
+            <a:ext cx="8505720" cy="3401640"/>
+          </a:xfrm>
+          <a:prstGeom prst="rect">
+            <a:avLst/>
+          </a:prstGeom>
+          <a:noFill/>
+          <a:ln>
+            <a:noFill/>
+          </a:ln>
+        </p:spPr>
+        <p:style>
+          <a:lnRef idx="0"/>
+          <a:fillRef idx="0"/>
+          <a:effectRef idx="0"/>
+          <a:fontRef idx="minor"/>
+        </p:style>
+        <p:txBody>
+          <a:bodyPr lIns="90000" rIns="90000" tIns="91440" bIns="91440">
+            <a:normAutofit/>
+          </a:bodyPr>
+          <a:p>
+            <a:pPr>
+              <a:lnSpc>
+                <a:spcPct val="115000"/>
+              </a:lnSpc>
+              <a:spcAft>
+                <a:spcPts val="1199"/>
+              </a:spcAft>
+            </a:pPr>
+            <a:r>
+              <a:rPr b="0" lang="en-US" sz="1800" spc="-1" strike="noStrike">
+                <a:solidFill>
+                  <a:srgbClr val="595959"/>
+                </a:solidFill>
+                <a:latin typeface="Arial"/>
+                <a:ea typeface="Arial"/>
+              </a:rPr>
+              <a:t>+++ EXTRA_SLIDE +++</a:t>
+            </a:r>
+            <a:endParaRPr b="0" lang="en-US" sz="1800" spc="-1" strike="noStrike">
+              <a:latin typeface="Arial"/>
+            </a:endParaRPr>
+          </a:p>
+        </p:txBody>
+      </p:sp>
+    </p:spTree>
+  </p:cSld>
+  <p:timing>
+    <p:tnLst>
+      <p:par>
+        <p:cTn id="29" dur="indefinite" restart="never" nodeType="tmRoot">
+          <p:childTnLst>
+            <p:seq>
+              <p:cTn id="30" dur="indefinite" nodeType="mainSeq"/>
               <p:prevCondLst>
                 <p:cond delay="0" evt="onPrev">
                   <p:tgtEl>
@@ -3791,7 +3999,7 @@
         <p:spPr>
           <a:xfrm>
             <a:off x="311760" y="444960"/>
-            <a:ext cx="8507160" cy="559440"/>
+            <a:ext cx="8505720" cy="558000"/>
           </a:xfrm>
           <a:prstGeom prst="rect">
             <a:avLst/>
@@ -3842,7 +4050,7 @@
         <p:spPr>
           <a:xfrm>
             <a:off x="311760" y="1152360"/>
-            <a:ext cx="8507160" cy="3403080"/>
+            <a:ext cx="8505720" cy="3401640"/>
           </a:xfrm>
           <a:prstGeom prst="rect">
             <a:avLst/>
@@ -3945,7 +4153,7 @@
         <p:spPr>
           <a:xfrm>
             <a:off x="731520" y="2419920"/>
-            <a:ext cx="7586280" cy="599040"/>
+            <a:ext cx="7584840" cy="597600"/>
           </a:xfrm>
           <a:prstGeom prst="rect">
             <a:avLst/>
@@ -4043,7 +4251,7 @@
         <p:spPr>
           <a:xfrm>
             <a:off x="311760" y="444960"/>
-            <a:ext cx="8507160" cy="559440"/>
+            <a:ext cx="8505720" cy="558000"/>
           </a:xfrm>
           <a:prstGeom prst="rect">
             <a:avLst/>
@@ -4094,7 +4302,7 @@
         <p:spPr>
           <a:xfrm>
             <a:off x="311760" y="1152360"/>
-            <a:ext cx="8507160" cy="3403080"/>
+            <a:ext cx="8505720" cy="3401640"/>
           </a:xfrm>
           <a:prstGeom prst="rect">
             <a:avLst/>
@@ -4166,6 +4374,11 @@
                   <a:txBody>
                     <a:bodyPr lIns="91080" rIns="91080"/>
                     <a:p>
+                      <a:pPr>
+                        <a:lnSpc>
+                          <a:spcPct val="100000"/>
+                        </a:lnSpc>
+                      </a:pPr>
                       <a:r>
                         <a:rPr b="0" lang="en-US" sz="1800" spc="-1" strike="noStrike">
                           <a:solidFill>
@@ -4749,7 +4962,7 @@
         <p:spPr>
           <a:xfrm>
             <a:off x="311760" y="444960"/>
-            <a:ext cx="8507160" cy="559440"/>
+            <a:ext cx="8505720" cy="558000"/>
           </a:xfrm>
           <a:prstGeom prst="rect">
             <a:avLst/>
@@ -4783,7 +4996,7 @@
                 <a:latin typeface="Arial"/>
                 <a:ea typeface="Arial"/>
               </a:rPr>
-              <a:t>+++INS sample_name +++</a:t>
+              <a:t>+++INS table_name +++</a:t>
             </a:r>
             <a:endParaRPr b="0" lang="en-US" sz="2800" spc="-1" strike="noStrike">
               <a:latin typeface="Arial"/>
@@ -4800,7 +5013,7 @@
         <p:spPr>
           <a:xfrm>
             <a:off x="311760" y="1152360"/>
-            <a:ext cx="8507160" cy="3403080"/>
+            <a:ext cx="8505720" cy="3401640"/>
           </a:xfrm>
           <a:prstGeom prst="rect">
             <a:avLst/>
@@ -4825,9 +5038,6 @@
               <a:lnSpc>
                 <a:spcPct val="115000"/>
               </a:lnSpc>
-              <a:spcBef>
-                <a:spcPts val="1199"/>
-              </a:spcBef>
               <a:spcAft>
                 <a:spcPts val="1199"/>
               </a:spcAft>
@@ -4840,36 +5050,936 @@
                 <a:latin typeface="Arial"/>
                 <a:ea typeface="Arial"/>
               </a:rPr>
-              <a:t>+++FOR ((SAMPLE_DATA_1))&lt;&lt; +++INS NAME +++  +++INS AGE +++&gt;&gt; FOR-END+++</a:t>
+              <a:t>+++IF ((not TABLE_1_ROW_3_PRESENT))&lt;&lt; +++TABLE_ROW_REMOVE ROW_ID_3 +++ &gt;&gt;IF-END+++</a:t>
             </a:r>
             <a:br/>
-            <a:r>
-              <a:rPr b="0" lang="en-US" sz="1800" spc="-1" strike="noStrike">
-                <a:solidFill>
-                  <a:srgbClr val="595959"/>
-                </a:solidFill>
-                <a:latin typeface="Arial"/>
-                <a:ea typeface="Arial"/>
-              </a:rPr>
-              <a:t>+++FOR ((SAMPLE_DATA_2))&lt;&lt; +++INS NAME +++   +++INS AGE +++ &gt;&gt; FOR-END+++</a:t>
-            </a:r>
-            <a:br/>
-            <a:r>
-              <a:rPr b="0" lang="en-US" sz="1800" spc="-1" strike="noStrike">
-                <a:solidFill>
-                  <a:srgbClr val="595959"/>
-                </a:solidFill>
-                <a:latin typeface="Arial"/>
-                <a:ea typeface="Arial"/>
-              </a:rPr>
-              <a:t>+++FOR ((SAMPLE_DATA_3))&lt;&lt; +++INS NAME +++    +++INS AGE +++ &gt;&gt; FOR-END+++</a:t>
-            </a:r>
             <a:endParaRPr b="0" lang="en-US" sz="1800" spc="-1" strike="noStrike">
               <a:latin typeface="Arial"/>
             </a:endParaRPr>
           </a:p>
         </p:txBody>
       </p:sp>
+      <p:graphicFrame>
+        <p:nvGraphicFramePr>
+          <p:cNvPr id="86" name="Table 3"/>
+          <p:cNvGraphicFramePr/>
+          <p:nvPr/>
+        </p:nvGraphicFramePr>
+        <p:xfrm>
+          <a:off x="952560" y="1809720"/>
+          <a:ext cx="7238160" cy="2077560"/>
+        </p:xfrm>
+        <a:graphic>
+          <a:graphicData uri="http://schemas.openxmlformats.org/drawingml/2006/table">
+            <a:tbl>
+              <a:tblPr/>
+              <a:tblGrid>
+                <a:gridCol w="1447560"/>
+                <a:gridCol w="1447560"/>
+                <a:gridCol w="1447560"/>
+                <a:gridCol w="1447560"/>
+                <a:gridCol w="1448280"/>
+              </a:tblGrid>
+              <a:tr h="519480">
+                <a:tc>
+                  <a:txBody>
+                    <a:bodyPr lIns="91080" rIns="91080"/>
+                    <a:p>
+                      <a:pPr>
+                        <a:lnSpc>
+                          <a:spcPct val="100000"/>
+                        </a:lnSpc>
+                      </a:pPr>
+                      <a:r>
+                        <a:rPr b="0" lang="en-US" sz="1800" spc="-1" strike="noStrike">
+                          <a:solidFill>
+                            <a:srgbClr val="595959"/>
+                          </a:solidFill>
+                          <a:latin typeface="Arial"/>
+                          <a:ea typeface="Arial"/>
+                        </a:rPr>
+                        <a:t>11</a:t>
+                      </a:r>
+                      <a:endParaRPr b="0" lang="en-US" sz="1800" spc="-1" strike="noStrike">
+                        <a:latin typeface="Arial"/>
+                      </a:endParaRPr>
+                    </a:p>
+                  </a:txBody>
+                  <a:tcPr marL="91080" marR="91080">
+                    <a:lnL w="9360">
+                      <a:solidFill>
+                        <a:srgbClr val="9e9e9e"/>
+                      </a:solidFill>
+                    </a:lnL>
+                    <a:lnR w="9360">
+                      <a:solidFill>
+                        <a:srgbClr val="9e9e9e"/>
+                      </a:solidFill>
+                    </a:lnR>
+                    <a:lnT w="9360">
+                      <a:solidFill>
+                        <a:srgbClr val="9e9e9e"/>
+                      </a:solidFill>
+                    </a:lnT>
+                    <a:lnB w="9360">
+                      <a:solidFill>
+                        <a:srgbClr val="9e9e9e"/>
+                      </a:solidFill>
+                    </a:lnB>
+                    <a:noFill/>
+                  </a:tcPr>
+                </a:tc>
+                <a:tc>
+                  <a:txBody>
+                    <a:bodyPr lIns="91080" rIns="91080"/>
+                    <a:p>
+                      <a:pPr>
+                        <a:lnSpc>
+                          <a:spcPct val="100000"/>
+                        </a:lnSpc>
+                      </a:pPr>
+                      <a:r>
+                        <a:rPr b="0" lang="en-US" sz="2400" spc="-1" strike="noStrike">
+                          <a:latin typeface="Times New Roman"/>
+                        </a:rPr>
+                        <a:t>2</a:t>
+                      </a:r>
+                      <a:endParaRPr b="0" lang="en-US" sz="2400" spc="-1" strike="noStrike">
+                        <a:latin typeface="Arial"/>
+                      </a:endParaRPr>
+                    </a:p>
+                  </a:txBody>
+                  <a:tcPr marL="91080" marR="91080">
+                    <a:lnL w="9360">
+                      <a:solidFill>
+                        <a:srgbClr val="9e9e9e"/>
+                      </a:solidFill>
+                    </a:lnL>
+                    <a:lnR w="9360">
+                      <a:solidFill>
+                        <a:srgbClr val="9e9e9e"/>
+                      </a:solidFill>
+                    </a:lnR>
+                    <a:lnT w="9360">
+                      <a:solidFill>
+                        <a:srgbClr val="9e9e9e"/>
+                      </a:solidFill>
+                    </a:lnT>
+                    <a:lnB w="9360">
+                      <a:solidFill>
+                        <a:srgbClr val="9e9e9e"/>
+                      </a:solidFill>
+                    </a:lnB>
+                    <a:noFill/>
+                  </a:tcPr>
+                </a:tc>
+                <a:tc>
+                  <a:txBody>
+                    <a:bodyPr lIns="91080" rIns="91080"/>
+                    <a:p>
+                      <a:pPr>
+                        <a:lnSpc>
+                          <a:spcPct val="100000"/>
+                        </a:lnSpc>
+                      </a:pPr>
+                      <a:r>
+                        <a:rPr b="0" lang="en-US" sz="2400" spc="-1" strike="noStrike">
+                          <a:latin typeface="Times New Roman"/>
+                        </a:rPr>
+                        <a:t>3</a:t>
+                      </a:r>
+                      <a:endParaRPr b="0" lang="en-US" sz="2400" spc="-1" strike="noStrike">
+                        <a:latin typeface="Arial"/>
+                      </a:endParaRPr>
+                    </a:p>
+                  </a:txBody>
+                  <a:tcPr marL="91080" marR="91080">
+                    <a:lnL w="9360">
+                      <a:solidFill>
+                        <a:srgbClr val="9e9e9e"/>
+                      </a:solidFill>
+                    </a:lnL>
+                    <a:lnR w="9360">
+                      <a:solidFill>
+                        <a:srgbClr val="9e9e9e"/>
+                      </a:solidFill>
+                    </a:lnR>
+                    <a:lnT w="9360">
+                      <a:solidFill>
+                        <a:srgbClr val="9e9e9e"/>
+                      </a:solidFill>
+                    </a:lnT>
+                    <a:lnB w="9360">
+                      <a:solidFill>
+                        <a:srgbClr val="9e9e9e"/>
+                      </a:solidFill>
+                    </a:lnB>
+                    <a:noFill/>
+                  </a:tcPr>
+                </a:tc>
+                <a:tc>
+                  <a:txBody>
+                    <a:bodyPr lIns="91080" rIns="91080"/>
+                    <a:p>
+                      <a:pPr>
+                        <a:lnSpc>
+                          <a:spcPct val="100000"/>
+                        </a:lnSpc>
+                      </a:pPr>
+                      <a:r>
+                        <a:rPr b="0" lang="en-US" sz="2400" spc="-1" strike="noStrike">
+                          <a:latin typeface="Times New Roman"/>
+                        </a:rPr>
+                        <a:t>4</a:t>
+                      </a:r>
+                      <a:endParaRPr b="0" lang="en-US" sz="2400" spc="-1" strike="noStrike">
+                        <a:latin typeface="Arial"/>
+                      </a:endParaRPr>
+                    </a:p>
+                  </a:txBody>
+                  <a:tcPr marL="91080" marR="91080">
+                    <a:lnL w="9360">
+                      <a:solidFill>
+                        <a:srgbClr val="9e9e9e"/>
+                      </a:solidFill>
+                    </a:lnL>
+                    <a:lnR w="9360">
+                      <a:solidFill>
+                        <a:srgbClr val="9e9e9e"/>
+                      </a:solidFill>
+                    </a:lnR>
+                    <a:lnT w="9360">
+                      <a:solidFill>
+                        <a:srgbClr val="9e9e9e"/>
+                      </a:solidFill>
+                    </a:lnT>
+                    <a:lnB w="9360">
+                      <a:solidFill>
+                        <a:srgbClr val="9e9e9e"/>
+                      </a:solidFill>
+                    </a:lnB>
+                    <a:noFill/>
+                  </a:tcPr>
+                </a:tc>
+                <a:tc>
+                  <a:txBody>
+                    <a:bodyPr lIns="91080" rIns="91080"/>
+                    <a:p>
+                      <a:pPr>
+                        <a:lnSpc>
+                          <a:spcPct val="100000"/>
+                        </a:lnSpc>
+                      </a:pPr>
+                      <a:r>
+                        <a:rPr b="0" lang="en-US" sz="2400" spc="-1" strike="noStrike">
+                          <a:latin typeface="Times New Roman"/>
+                        </a:rPr>
+                        <a:t>5</a:t>
+                      </a:r>
+                      <a:endParaRPr b="0" lang="en-US" sz="2400" spc="-1" strike="noStrike">
+                        <a:latin typeface="Arial"/>
+                      </a:endParaRPr>
+                    </a:p>
+                  </a:txBody>
+                  <a:tcPr marL="91080" marR="91080">
+                    <a:lnL w="9360">
+                      <a:solidFill>
+                        <a:srgbClr val="9e9e9e"/>
+                      </a:solidFill>
+                    </a:lnL>
+                    <a:lnR w="9360">
+                      <a:solidFill>
+                        <a:srgbClr val="9e9e9e"/>
+                      </a:solidFill>
+                    </a:lnR>
+                    <a:lnT w="9360">
+                      <a:solidFill>
+                        <a:srgbClr val="9e9e9e"/>
+                      </a:solidFill>
+                    </a:lnT>
+                    <a:lnB w="9360">
+                      <a:solidFill>
+                        <a:srgbClr val="9e9e9e"/>
+                      </a:solidFill>
+                    </a:lnB>
+                    <a:noFill/>
+                  </a:tcPr>
+                </a:tc>
+              </a:tr>
+              <a:tr h="519480">
+                <a:tc>
+                  <a:txBody>
+                    <a:bodyPr lIns="91080" rIns="91080"/>
+                    <a:p>
+                      <a:pPr>
+                        <a:lnSpc>
+                          <a:spcPct val="100000"/>
+                        </a:lnSpc>
+                      </a:pPr>
+                      <a:r>
+                        <a:rPr b="0" lang="en-US" sz="2400" spc="-1" strike="noStrike">
+                          <a:latin typeface="Times New Roman"/>
+                        </a:rPr>
+                        <a:t>11</a:t>
+                      </a:r>
+                      <a:endParaRPr b="0" lang="en-US" sz="2400" spc="-1" strike="noStrike">
+                        <a:latin typeface="Arial"/>
+                      </a:endParaRPr>
+                    </a:p>
+                  </a:txBody>
+                  <a:tcPr marL="91080" marR="91080">
+                    <a:lnL w="9360">
+                      <a:solidFill>
+                        <a:srgbClr val="9e9e9e"/>
+                      </a:solidFill>
+                    </a:lnL>
+                    <a:lnR w="9360">
+                      <a:solidFill>
+                        <a:srgbClr val="9e9e9e"/>
+                      </a:solidFill>
+                    </a:lnR>
+                    <a:lnT w="9360">
+                      <a:solidFill>
+                        <a:srgbClr val="9e9e9e"/>
+                      </a:solidFill>
+                    </a:lnT>
+                    <a:lnB w="9360">
+                      <a:solidFill>
+                        <a:srgbClr val="9e9e9e"/>
+                      </a:solidFill>
+                    </a:lnB>
+                    <a:noFill/>
+                  </a:tcPr>
+                </a:tc>
+                <a:tc>
+                  <a:txBody>
+                    <a:bodyPr lIns="91080" rIns="91080"/>
+                    <a:p>
+                      <a:pPr>
+                        <a:lnSpc>
+                          <a:spcPct val="100000"/>
+                        </a:lnSpc>
+                      </a:pPr>
+                      <a:r>
+                        <a:rPr b="0" lang="en-US" sz="2400" spc="-1" strike="noStrike">
+                          <a:latin typeface="Times New Roman"/>
+                        </a:rPr>
+                        <a:t>12</a:t>
+                      </a:r>
+                      <a:endParaRPr b="0" lang="en-US" sz="2400" spc="-1" strike="noStrike">
+                        <a:latin typeface="Arial"/>
+                      </a:endParaRPr>
+                    </a:p>
+                  </a:txBody>
+                  <a:tcPr marL="91080" marR="91080">
+                    <a:lnL w="9360">
+                      <a:solidFill>
+                        <a:srgbClr val="9e9e9e"/>
+                      </a:solidFill>
+                    </a:lnL>
+                    <a:lnR w="9360">
+                      <a:solidFill>
+                        <a:srgbClr val="9e9e9e"/>
+                      </a:solidFill>
+                    </a:lnR>
+                    <a:lnT w="9360">
+                      <a:solidFill>
+                        <a:srgbClr val="9e9e9e"/>
+                      </a:solidFill>
+                    </a:lnT>
+                    <a:lnB w="9360">
+                      <a:solidFill>
+                        <a:srgbClr val="9e9e9e"/>
+                      </a:solidFill>
+                    </a:lnB>
+                    <a:noFill/>
+                  </a:tcPr>
+                </a:tc>
+                <a:tc>
+                  <a:txBody>
+                    <a:bodyPr lIns="91080" rIns="91080"/>
+                    <a:p>
+                      <a:pPr>
+                        <a:lnSpc>
+                          <a:spcPct val="100000"/>
+                        </a:lnSpc>
+                      </a:pPr>
+                      <a:r>
+                        <a:rPr b="0" lang="en-US" sz="2400" spc="-1" strike="noStrike">
+                          <a:latin typeface="Times New Roman"/>
+                        </a:rPr>
+                        <a:t>13</a:t>
+                      </a:r>
+                      <a:endParaRPr b="0" lang="en-US" sz="2400" spc="-1" strike="noStrike">
+                        <a:latin typeface="Arial"/>
+                      </a:endParaRPr>
+                    </a:p>
+                  </a:txBody>
+                  <a:tcPr marL="91080" marR="91080">
+                    <a:lnL w="9360">
+                      <a:solidFill>
+                        <a:srgbClr val="9e9e9e"/>
+                      </a:solidFill>
+                    </a:lnL>
+                    <a:lnR w="9360">
+                      <a:solidFill>
+                        <a:srgbClr val="9e9e9e"/>
+                      </a:solidFill>
+                    </a:lnR>
+                    <a:lnT w="9360">
+                      <a:solidFill>
+                        <a:srgbClr val="9e9e9e"/>
+                      </a:solidFill>
+                    </a:lnT>
+                    <a:lnB w="9360">
+                      <a:solidFill>
+                        <a:srgbClr val="9e9e9e"/>
+                      </a:solidFill>
+                    </a:lnB>
+                    <a:noFill/>
+                  </a:tcPr>
+                </a:tc>
+                <a:tc>
+                  <a:txBody>
+                    <a:bodyPr lIns="91080" rIns="91080"/>
+                    <a:p>
+                      <a:pPr>
+                        <a:lnSpc>
+                          <a:spcPct val="100000"/>
+                        </a:lnSpc>
+                      </a:pPr>
+                      <a:r>
+                        <a:rPr b="0" lang="en-US" sz="2400" spc="-1" strike="noStrike">
+                          <a:latin typeface="Times New Roman"/>
+                        </a:rPr>
+                        <a:t>14</a:t>
+                      </a:r>
+                      <a:endParaRPr b="0" lang="en-US" sz="2400" spc="-1" strike="noStrike">
+                        <a:latin typeface="Arial"/>
+                      </a:endParaRPr>
+                    </a:p>
+                  </a:txBody>
+                  <a:tcPr marL="91080" marR="91080">
+                    <a:lnL w="9360">
+                      <a:solidFill>
+                        <a:srgbClr val="9e9e9e"/>
+                      </a:solidFill>
+                    </a:lnL>
+                    <a:lnR w="9360">
+                      <a:solidFill>
+                        <a:srgbClr val="9e9e9e"/>
+                      </a:solidFill>
+                    </a:lnR>
+                    <a:lnT w="9360">
+                      <a:solidFill>
+                        <a:srgbClr val="9e9e9e"/>
+                      </a:solidFill>
+                    </a:lnT>
+                    <a:lnB w="9360">
+                      <a:solidFill>
+                        <a:srgbClr val="9e9e9e"/>
+                      </a:solidFill>
+                    </a:lnB>
+                    <a:noFill/>
+                  </a:tcPr>
+                </a:tc>
+                <a:tc>
+                  <a:txBody>
+                    <a:bodyPr lIns="91080" rIns="91080"/>
+                    <a:p>
+                      <a:pPr>
+                        <a:lnSpc>
+                          <a:spcPct val="100000"/>
+                        </a:lnSpc>
+                      </a:pPr>
+                      <a:r>
+                        <a:rPr b="0" lang="en-US" sz="2400" spc="-1" strike="noStrike">
+                          <a:latin typeface="Times New Roman"/>
+                        </a:rPr>
+                        <a:t>15</a:t>
+                      </a:r>
+                      <a:endParaRPr b="0" lang="en-US" sz="2400" spc="-1" strike="noStrike">
+                        <a:latin typeface="Arial"/>
+                      </a:endParaRPr>
+                    </a:p>
+                  </a:txBody>
+                  <a:tcPr marL="91080" marR="91080">
+                    <a:lnL w="9360">
+                      <a:solidFill>
+                        <a:srgbClr val="9e9e9e"/>
+                      </a:solidFill>
+                    </a:lnL>
+                    <a:lnR w="9360">
+                      <a:solidFill>
+                        <a:srgbClr val="9e9e9e"/>
+                      </a:solidFill>
+                    </a:lnR>
+                    <a:lnT w="9360">
+                      <a:solidFill>
+                        <a:srgbClr val="9e9e9e"/>
+                      </a:solidFill>
+                    </a:lnT>
+                    <a:lnB w="9360">
+                      <a:solidFill>
+                        <a:srgbClr val="9e9e9e"/>
+                      </a:solidFill>
+                    </a:lnB>
+                    <a:noFill/>
+                  </a:tcPr>
+                </a:tc>
+              </a:tr>
+              <a:tr h="519480">
+                <a:tc>
+                  <a:txBody>
+                    <a:bodyPr lIns="91080" rIns="91080"/>
+                    <a:p>
+                      <a:pPr>
+                        <a:lnSpc>
+                          <a:spcPct val="100000"/>
+                        </a:lnSpc>
+                      </a:pPr>
+                      <a:r>
+                        <a:rPr b="0" lang="en-US" sz="1800" spc="-1" strike="noStrike">
+                          <a:solidFill>
+                            <a:srgbClr val="595959"/>
+                          </a:solidFill>
+                          <a:latin typeface="Arial"/>
+                          <a:ea typeface="Arial"/>
+                        </a:rPr>
+                        <a:t>ROW_ID_3 21 </a:t>
+                      </a:r>
+                      <a:endParaRPr b="0" lang="en-US" sz="1800" spc="-1" strike="noStrike">
+                        <a:latin typeface="Arial"/>
+                      </a:endParaRPr>
+                    </a:p>
+                  </a:txBody>
+                  <a:tcPr marL="91080" marR="91080">
+                    <a:lnL w="9360">
+                      <a:solidFill>
+                        <a:srgbClr val="9e9e9e"/>
+                      </a:solidFill>
+                    </a:lnL>
+                    <a:lnR w="9360">
+                      <a:solidFill>
+                        <a:srgbClr val="9e9e9e"/>
+                      </a:solidFill>
+                    </a:lnR>
+                    <a:lnT w="9360">
+                      <a:solidFill>
+                        <a:srgbClr val="9e9e9e"/>
+                      </a:solidFill>
+                    </a:lnT>
+                    <a:lnB w="9360">
+                      <a:solidFill>
+                        <a:srgbClr val="9e9e9e"/>
+                      </a:solidFill>
+                    </a:lnB>
+                    <a:noFill/>
+                  </a:tcPr>
+                </a:tc>
+                <a:tc>
+                  <a:txBody>
+                    <a:bodyPr lIns="91080" rIns="91080"/>
+                    <a:p>
+                      <a:pPr>
+                        <a:lnSpc>
+                          <a:spcPct val="100000"/>
+                        </a:lnSpc>
+                      </a:pPr>
+                      <a:r>
+                        <a:rPr b="0" lang="en-US" sz="2400" spc="-1" strike="noStrike">
+                          <a:latin typeface="Times New Roman"/>
+                        </a:rPr>
+                        <a:t>22</a:t>
+                      </a:r>
+                      <a:endParaRPr b="0" lang="en-US" sz="2400" spc="-1" strike="noStrike">
+                        <a:latin typeface="Arial"/>
+                      </a:endParaRPr>
+                    </a:p>
+                  </a:txBody>
+                  <a:tcPr marL="91080" marR="91080">
+                    <a:lnL w="9360">
+                      <a:solidFill>
+                        <a:srgbClr val="9e9e9e"/>
+                      </a:solidFill>
+                    </a:lnL>
+                    <a:lnR w="9360">
+                      <a:solidFill>
+                        <a:srgbClr val="9e9e9e"/>
+                      </a:solidFill>
+                    </a:lnR>
+                    <a:lnT w="9360">
+                      <a:solidFill>
+                        <a:srgbClr val="9e9e9e"/>
+                      </a:solidFill>
+                    </a:lnT>
+                    <a:lnB w="9360">
+                      <a:solidFill>
+                        <a:srgbClr val="9e9e9e"/>
+                      </a:solidFill>
+                    </a:lnB>
+                    <a:noFill/>
+                  </a:tcPr>
+                </a:tc>
+                <a:tc>
+                  <a:txBody>
+                    <a:bodyPr lIns="91080" rIns="91080"/>
+                    <a:p>
+                      <a:pPr>
+                        <a:lnSpc>
+                          <a:spcPct val="100000"/>
+                        </a:lnSpc>
+                      </a:pPr>
+                      <a:r>
+                        <a:rPr b="0" lang="en-US" sz="2400" spc="-1" strike="noStrike">
+                          <a:latin typeface="Times New Roman"/>
+                        </a:rPr>
+                        <a:t>23</a:t>
+                      </a:r>
+                      <a:endParaRPr b="0" lang="en-US" sz="2400" spc="-1" strike="noStrike">
+                        <a:latin typeface="Arial"/>
+                      </a:endParaRPr>
+                    </a:p>
+                  </a:txBody>
+                  <a:tcPr marL="91080" marR="91080">
+                    <a:lnL w="9360">
+                      <a:solidFill>
+                        <a:srgbClr val="9e9e9e"/>
+                      </a:solidFill>
+                    </a:lnL>
+                    <a:lnR w="9360">
+                      <a:solidFill>
+                        <a:srgbClr val="9e9e9e"/>
+                      </a:solidFill>
+                    </a:lnR>
+                    <a:lnT w="9360">
+                      <a:solidFill>
+                        <a:srgbClr val="9e9e9e"/>
+                      </a:solidFill>
+                    </a:lnT>
+                    <a:lnB w="9360">
+                      <a:solidFill>
+                        <a:srgbClr val="9e9e9e"/>
+                      </a:solidFill>
+                    </a:lnB>
+                    <a:noFill/>
+                  </a:tcPr>
+                </a:tc>
+                <a:tc>
+                  <a:txBody>
+                    <a:bodyPr lIns="91080" rIns="91080"/>
+                    <a:p>
+                      <a:pPr>
+                        <a:lnSpc>
+                          <a:spcPct val="100000"/>
+                        </a:lnSpc>
+                      </a:pPr>
+                      <a:r>
+                        <a:rPr b="0" lang="en-US" sz="2400" spc="-1" strike="noStrike">
+                          <a:latin typeface="Times New Roman"/>
+                        </a:rPr>
+                        <a:t>24</a:t>
+                      </a:r>
+                      <a:endParaRPr b="0" lang="en-US" sz="2400" spc="-1" strike="noStrike">
+                        <a:latin typeface="Arial"/>
+                      </a:endParaRPr>
+                    </a:p>
+                  </a:txBody>
+                  <a:tcPr marL="91080" marR="91080">
+                    <a:lnL w="9360">
+                      <a:solidFill>
+                        <a:srgbClr val="9e9e9e"/>
+                      </a:solidFill>
+                    </a:lnL>
+                    <a:lnR w="9360">
+                      <a:solidFill>
+                        <a:srgbClr val="9e9e9e"/>
+                      </a:solidFill>
+                    </a:lnR>
+                    <a:lnT w="9360">
+                      <a:solidFill>
+                        <a:srgbClr val="9e9e9e"/>
+                      </a:solidFill>
+                    </a:lnT>
+                    <a:lnB w="9360">
+                      <a:solidFill>
+                        <a:srgbClr val="9e9e9e"/>
+                      </a:solidFill>
+                    </a:lnB>
+                    <a:noFill/>
+                  </a:tcPr>
+                </a:tc>
+                <a:tc>
+                  <a:txBody>
+                    <a:bodyPr lIns="91080" rIns="91080"/>
+                    <a:p>
+                      <a:pPr>
+                        <a:lnSpc>
+                          <a:spcPct val="100000"/>
+                        </a:lnSpc>
+                      </a:pPr>
+                      <a:r>
+                        <a:rPr b="0" lang="en-US" sz="2400" spc="-1" strike="noStrike">
+                          <a:latin typeface="Times New Roman"/>
+                        </a:rPr>
+                        <a:t>25</a:t>
+                      </a:r>
+                      <a:endParaRPr b="0" lang="en-US" sz="2400" spc="-1" strike="noStrike">
+                        <a:latin typeface="Arial"/>
+                      </a:endParaRPr>
+                    </a:p>
+                  </a:txBody>
+                  <a:tcPr marL="91080" marR="91080">
+                    <a:lnL w="9360">
+                      <a:solidFill>
+                        <a:srgbClr val="9e9e9e"/>
+                      </a:solidFill>
+                    </a:lnL>
+                    <a:lnR w="9360">
+                      <a:solidFill>
+                        <a:srgbClr val="9e9e9e"/>
+                      </a:solidFill>
+                    </a:lnR>
+                    <a:lnT w="9360">
+                      <a:solidFill>
+                        <a:srgbClr val="9e9e9e"/>
+                      </a:solidFill>
+                    </a:lnT>
+                    <a:lnB w="9360">
+                      <a:solidFill>
+                        <a:srgbClr val="9e9e9e"/>
+                      </a:solidFill>
+                    </a:lnB>
+                    <a:noFill/>
+                  </a:tcPr>
+                </a:tc>
+              </a:tr>
+              <a:tr h="519480">
+                <a:tc>
+                  <a:txBody>
+                    <a:bodyPr lIns="91080" rIns="91080"/>
+                    <a:p>
+                      <a:pPr>
+                        <a:lnSpc>
+                          <a:spcPct val="100000"/>
+                        </a:lnSpc>
+                      </a:pPr>
+                      <a:r>
+                        <a:rPr b="0" lang="en-US" sz="2400" spc="-1" strike="noStrike">
+                          <a:latin typeface="Times New Roman"/>
+                        </a:rPr>
+                        <a:t>31</a:t>
+                      </a:r>
+                      <a:endParaRPr b="0" lang="en-US" sz="2400" spc="-1" strike="noStrike">
+                        <a:latin typeface="Arial"/>
+                      </a:endParaRPr>
+                    </a:p>
+                  </a:txBody>
+                  <a:tcPr marL="91080" marR="91080">
+                    <a:lnL w="9360">
+                      <a:solidFill>
+                        <a:srgbClr val="9e9e9e"/>
+                      </a:solidFill>
+                    </a:lnL>
+                    <a:lnR w="9360">
+                      <a:solidFill>
+                        <a:srgbClr val="9e9e9e"/>
+                      </a:solidFill>
+                    </a:lnR>
+                    <a:lnT w="9360">
+                      <a:solidFill>
+                        <a:srgbClr val="9e9e9e"/>
+                      </a:solidFill>
+                    </a:lnT>
+                    <a:lnB w="9360">
+                      <a:solidFill>
+                        <a:srgbClr val="9e9e9e"/>
+                      </a:solidFill>
+                    </a:lnB>
+                    <a:noFill/>
+                  </a:tcPr>
+                </a:tc>
+                <a:tc>
+                  <a:txBody>
+                    <a:bodyPr lIns="91080" rIns="91080"/>
+                    <a:p>
+                      <a:pPr>
+                        <a:lnSpc>
+                          <a:spcPct val="100000"/>
+                        </a:lnSpc>
+                      </a:pPr>
+                      <a:r>
+                        <a:rPr b="0" lang="en-US" sz="2400" spc="-1" strike="noStrike">
+                          <a:latin typeface="Times New Roman"/>
+                        </a:rPr>
+                        <a:t>32</a:t>
+                      </a:r>
+                      <a:endParaRPr b="0" lang="en-US" sz="2400" spc="-1" strike="noStrike">
+                        <a:latin typeface="Arial"/>
+                      </a:endParaRPr>
+                    </a:p>
+                  </a:txBody>
+                  <a:tcPr marL="91080" marR="91080">
+                    <a:lnL w="9360">
+                      <a:solidFill>
+                        <a:srgbClr val="9e9e9e"/>
+                      </a:solidFill>
+                    </a:lnL>
+                    <a:lnR w="9360">
+                      <a:solidFill>
+                        <a:srgbClr val="9e9e9e"/>
+                      </a:solidFill>
+                    </a:lnR>
+                    <a:lnT w="9360">
+                      <a:solidFill>
+                        <a:srgbClr val="9e9e9e"/>
+                      </a:solidFill>
+                    </a:lnT>
+                    <a:lnB w="9360">
+                      <a:solidFill>
+                        <a:srgbClr val="9e9e9e"/>
+                      </a:solidFill>
+                    </a:lnB>
+                    <a:noFill/>
+                  </a:tcPr>
+                </a:tc>
+                <a:tc>
+                  <a:txBody>
+                    <a:bodyPr lIns="91080" rIns="91080"/>
+                    <a:p>
+                      <a:pPr>
+                        <a:lnSpc>
+                          <a:spcPct val="100000"/>
+                        </a:lnSpc>
+                      </a:pPr>
+                      <a:r>
+                        <a:rPr b="0" lang="en-US" sz="2400" spc="-1" strike="noStrike">
+                          <a:latin typeface="Times New Roman"/>
+                        </a:rPr>
+                        <a:t>33</a:t>
+                      </a:r>
+                      <a:endParaRPr b="0" lang="en-US" sz="2400" spc="-1" strike="noStrike">
+                        <a:latin typeface="Arial"/>
+                      </a:endParaRPr>
+                    </a:p>
+                  </a:txBody>
+                  <a:tcPr marL="91080" marR="91080">
+                    <a:lnL w="9360">
+                      <a:solidFill>
+                        <a:srgbClr val="9e9e9e"/>
+                      </a:solidFill>
+                    </a:lnL>
+                    <a:lnR w="9360">
+                      <a:solidFill>
+                        <a:srgbClr val="9e9e9e"/>
+                      </a:solidFill>
+                    </a:lnR>
+                    <a:lnT w="9360">
+                      <a:solidFill>
+                        <a:srgbClr val="9e9e9e"/>
+                      </a:solidFill>
+                    </a:lnT>
+                    <a:lnB w="9360">
+                      <a:solidFill>
+                        <a:srgbClr val="9e9e9e"/>
+                      </a:solidFill>
+                    </a:lnB>
+                    <a:noFill/>
+                  </a:tcPr>
+                </a:tc>
+                <a:tc>
+                  <a:txBody>
+                    <a:bodyPr lIns="91080" rIns="91080"/>
+                    <a:p>
+                      <a:pPr>
+                        <a:lnSpc>
+                          <a:spcPct val="100000"/>
+                        </a:lnSpc>
+                      </a:pPr>
+                      <a:r>
+                        <a:rPr b="0" lang="en-US" sz="2400" spc="-1" strike="noStrike">
+                          <a:latin typeface="Times New Roman"/>
+                        </a:rPr>
+                        <a:t>34</a:t>
+                      </a:r>
+                      <a:endParaRPr b="0" lang="en-US" sz="2400" spc="-1" strike="noStrike">
+                        <a:latin typeface="Arial"/>
+                      </a:endParaRPr>
+                    </a:p>
+                  </a:txBody>
+                  <a:tcPr marL="91080" marR="91080">
+                    <a:lnL w="9360">
+                      <a:solidFill>
+                        <a:srgbClr val="9e9e9e"/>
+                      </a:solidFill>
+                    </a:lnL>
+                    <a:lnR w="9360">
+                      <a:solidFill>
+                        <a:srgbClr val="9e9e9e"/>
+                      </a:solidFill>
+                    </a:lnR>
+                    <a:lnT w="9360">
+                      <a:solidFill>
+                        <a:srgbClr val="9e9e9e"/>
+                      </a:solidFill>
+                    </a:lnT>
+                    <a:lnB w="9360">
+                      <a:solidFill>
+                        <a:srgbClr val="9e9e9e"/>
+                      </a:solidFill>
+                    </a:lnB>
+                    <a:noFill/>
+                  </a:tcPr>
+                </a:tc>
+                <a:tc>
+                  <a:txBody>
+                    <a:bodyPr lIns="91080" rIns="91080"/>
+                    <a:p>
+                      <a:pPr>
+                        <a:lnSpc>
+                          <a:spcPct val="100000"/>
+                        </a:lnSpc>
+                      </a:pPr>
+                      <a:r>
+                        <a:rPr b="0" lang="en-US" sz="1800" spc="-1" strike="noStrike">
+                          <a:latin typeface="Arial"/>
+                        </a:rPr>
+                        <a:t>35</a:t>
+                      </a:r>
+                      <a:endParaRPr b="0" lang="en-US" sz="1800" spc="-1" strike="noStrike">
+                        <a:latin typeface="Arial"/>
+                      </a:endParaRPr>
+                    </a:p>
+                  </a:txBody>
+                  <a:tcPr marL="91080" marR="91080">
+                    <a:lnL w="9360">
+                      <a:solidFill>
+                        <a:srgbClr val="9e9e9e"/>
+                      </a:solidFill>
+                    </a:lnL>
+                    <a:lnR w="9360">
+                      <a:solidFill>
+                        <a:srgbClr val="9e9e9e"/>
+                      </a:solidFill>
+                    </a:lnR>
+                    <a:lnT w="9360">
+                      <a:solidFill>
+                        <a:srgbClr val="9e9e9e"/>
+                      </a:solidFill>
+                    </a:lnT>
+                    <a:lnB w="9360">
+                      <a:solidFill>
+                        <a:srgbClr val="9e9e9e"/>
+                      </a:solidFill>
+                    </a:lnB>
+                    <a:noFill/>
+                  </a:tcPr>
+                </a:tc>
+              </a:tr>
+            </a:tbl>
+          </a:graphicData>
+        </a:graphic>
+      </p:graphicFrame>
     </p:spTree>
   </p:cSld>
   <p:timing>
@@ -4921,14 +6031,14 @@
       </p:grpSpPr>
       <p:sp>
         <p:nvSpPr>
-          <p:cNvPr id="86" name="CustomShape 1"/>
+          <p:cNvPr id="87" name="CustomShape 1"/>
           <p:cNvSpPr/>
           <p:nvPr/>
         </p:nvSpPr>
         <p:spPr>
           <a:xfrm>
             <a:off x="311760" y="444960"/>
-            <a:ext cx="8507160" cy="559440"/>
+            <a:ext cx="8505720" cy="558000"/>
           </a:xfrm>
           <a:prstGeom prst="rect">
             <a:avLst/>
@@ -4944,17 +6054,42 @@
           <a:effectRef idx="0"/>
           <a:fontRef idx="minor"/>
         </p:style>
-      </p:sp>
-      <p:sp>
-        <p:nvSpPr>
-          <p:cNvPr id="87" name="CustomShape 2"/>
+        <p:txBody>
+          <a:bodyPr lIns="90000" rIns="90000" tIns="91440" bIns="91440">
+            <a:normAutofit/>
+          </a:bodyPr>
+          <a:p>
+            <a:pPr>
+              <a:lnSpc>
+                <a:spcPct val="100000"/>
+              </a:lnSpc>
+            </a:pPr>
+            <a:r>
+              <a:rPr b="0" lang="en-US" sz="2800" spc="-1" strike="noStrike">
+                <a:solidFill>
+                  <a:srgbClr val="000000"/>
+                </a:solidFill>
+                <a:latin typeface="Arial"/>
+                <a:ea typeface="Arial"/>
+              </a:rPr>
+              <a:t>+++INS table_name +++</a:t>
+            </a:r>
+            <a:endParaRPr b="0" lang="en-US" sz="2800" spc="-1" strike="noStrike">
+              <a:latin typeface="Arial"/>
+            </a:endParaRPr>
+          </a:p>
+        </p:txBody>
+      </p:sp>
+      <p:sp>
+        <p:nvSpPr>
+          <p:cNvPr id="88" name="CustomShape 2"/>
           <p:cNvSpPr/>
           <p:nvPr/>
         </p:nvSpPr>
         <p:spPr>
           <a:xfrm>
             <a:off x="311760" y="1152360"/>
-            <a:ext cx="8507160" cy="3403080"/>
+            <a:ext cx="8505720" cy="3401640"/>
           </a:xfrm>
           <a:prstGeom prst="rect">
             <a:avLst/>
@@ -4991,14 +6126,950 @@
                 <a:latin typeface="Arial"/>
                 <a:ea typeface="Arial"/>
               </a:rPr>
-              <a:t>+++TABLE_ADD cashFlows +++</a:t>
+              <a:t>+++IF ((not TABLE_1_COLUMN_4_PRESENT))&lt;&lt; +++TABLE_COLUMN_REMOVE COLUMN_ID_4 +++ &gt;&gt;IF-END+++</a:t>
             </a:r>
+            <a:br/>
             <a:endParaRPr b="0" lang="en-US" sz="1800" spc="-1" strike="noStrike">
               <a:latin typeface="Arial"/>
             </a:endParaRPr>
           </a:p>
         </p:txBody>
       </p:sp>
+      <p:graphicFrame>
+        <p:nvGraphicFramePr>
+          <p:cNvPr id="89" name="Table 3"/>
+          <p:cNvGraphicFramePr/>
+          <p:nvPr/>
+        </p:nvGraphicFramePr>
+        <p:xfrm>
+          <a:off x="952560" y="1809720"/>
+          <a:ext cx="7238160" cy="2077560"/>
+        </p:xfrm>
+        <a:graphic>
+          <a:graphicData uri="http://schemas.openxmlformats.org/drawingml/2006/table">
+            <a:tbl>
+              <a:tblPr/>
+              <a:tblGrid>
+                <a:gridCol w="1447560"/>
+                <a:gridCol w="1447560"/>
+                <a:gridCol w="1447560"/>
+                <a:gridCol w="1447560"/>
+                <a:gridCol w="1448280"/>
+              </a:tblGrid>
+              <a:tr h="519480">
+                <a:tc>
+                  <a:txBody>
+                    <a:bodyPr lIns="91080" rIns="91080"/>
+                    <a:p>
+                      <a:pPr>
+                        <a:lnSpc>
+                          <a:spcPct val="100000"/>
+                        </a:lnSpc>
+                      </a:pPr>
+                      <a:r>
+                        <a:rPr b="0" lang="en-US" sz="1800" spc="-1" strike="noStrike">
+                          <a:solidFill>
+                            <a:srgbClr val="595959"/>
+                          </a:solidFill>
+                          <a:latin typeface="Arial"/>
+                          <a:ea typeface="Arial"/>
+                        </a:rPr>
+                        <a:t>11</a:t>
+                      </a:r>
+                      <a:endParaRPr b="0" lang="en-US" sz="1800" spc="-1" strike="noStrike">
+                        <a:latin typeface="Arial"/>
+                      </a:endParaRPr>
+                    </a:p>
+                  </a:txBody>
+                  <a:tcPr marL="91080" marR="91080">
+                    <a:lnL w="9360">
+                      <a:solidFill>
+                        <a:srgbClr val="9e9e9e"/>
+                      </a:solidFill>
+                    </a:lnL>
+                    <a:lnR w="9360">
+                      <a:solidFill>
+                        <a:srgbClr val="9e9e9e"/>
+                      </a:solidFill>
+                    </a:lnR>
+                    <a:lnT w="9360">
+                      <a:solidFill>
+                        <a:srgbClr val="9e9e9e"/>
+                      </a:solidFill>
+                    </a:lnT>
+                    <a:lnB w="9360">
+                      <a:solidFill>
+                        <a:srgbClr val="9e9e9e"/>
+                      </a:solidFill>
+                    </a:lnB>
+                    <a:noFill/>
+                  </a:tcPr>
+                </a:tc>
+                <a:tc>
+                  <a:txBody>
+                    <a:bodyPr lIns="91080" rIns="91080"/>
+                    <a:p>
+                      <a:pPr>
+                        <a:lnSpc>
+                          <a:spcPct val="100000"/>
+                        </a:lnSpc>
+                      </a:pPr>
+                      <a:r>
+                        <a:rPr b="0" lang="en-US" sz="2400" spc="-1" strike="noStrike">
+                          <a:latin typeface="Times New Roman"/>
+                        </a:rPr>
+                        <a:t>2</a:t>
+                      </a:r>
+                      <a:endParaRPr b="0" lang="en-US" sz="2400" spc="-1" strike="noStrike">
+                        <a:latin typeface="Arial"/>
+                      </a:endParaRPr>
+                    </a:p>
+                  </a:txBody>
+                  <a:tcPr marL="91080" marR="91080">
+                    <a:lnL w="9360">
+                      <a:solidFill>
+                        <a:srgbClr val="9e9e9e"/>
+                      </a:solidFill>
+                    </a:lnL>
+                    <a:lnR w="9360">
+                      <a:solidFill>
+                        <a:srgbClr val="9e9e9e"/>
+                      </a:solidFill>
+                    </a:lnR>
+                    <a:lnT w="9360">
+                      <a:solidFill>
+                        <a:srgbClr val="9e9e9e"/>
+                      </a:solidFill>
+                    </a:lnT>
+                    <a:lnB w="9360">
+                      <a:solidFill>
+                        <a:srgbClr val="9e9e9e"/>
+                      </a:solidFill>
+                    </a:lnB>
+                    <a:noFill/>
+                  </a:tcPr>
+                </a:tc>
+                <a:tc>
+                  <a:txBody>
+                    <a:bodyPr lIns="91080" rIns="91080"/>
+                    <a:p>
+                      <a:pPr>
+                        <a:lnSpc>
+                          <a:spcPct val="100000"/>
+                        </a:lnSpc>
+                      </a:pPr>
+                      <a:r>
+                        <a:rPr b="0" lang="en-US" sz="2400" spc="-1" strike="noStrike">
+                          <a:latin typeface="Times New Roman"/>
+                        </a:rPr>
+                        <a:t>3</a:t>
+                      </a:r>
+                      <a:endParaRPr b="0" lang="en-US" sz="2400" spc="-1" strike="noStrike">
+                        <a:latin typeface="Arial"/>
+                      </a:endParaRPr>
+                    </a:p>
+                  </a:txBody>
+                  <a:tcPr marL="91080" marR="91080">
+                    <a:lnL w="9360">
+                      <a:solidFill>
+                        <a:srgbClr val="9e9e9e"/>
+                      </a:solidFill>
+                    </a:lnL>
+                    <a:lnR w="9360">
+                      <a:solidFill>
+                        <a:srgbClr val="9e9e9e"/>
+                      </a:solidFill>
+                    </a:lnR>
+                    <a:lnT w="9360">
+                      <a:solidFill>
+                        <a:srgbClr val="9e9e9e"/>
+                      </a:solidFill>
+                    </a:lnT>
+                    <a:lnB w="9360">
+                      <a:solidFill>
+                        <a:srgbClr val="9e9e9e"/>
+                      </a:solidFill>
+                    </a:lnB>
+                    <a:noFill/>
+                  </a:tcPr>
+                </a:tc>
+                <a:tc>
+                  <a:txBody>
+                    <a:bodyPr lIns="91080" rIns="91080"/>
+                    <a:p>
+                      <a:pPr>
+                        <a:lnSpc>
+                          <a:spcPct val="100000"/>
+                        </a:lnSpc>
+                      </a:pPr>
+                      <a:r>
+                        <a:rPr b="0" lang="en-US" sz="1800" spc="-1" strike="noStrike">
+                          <a:solidFill>
+                            <a:srgbClr val="595959"/>
+                          </a:solidFill>
+                          <a:latin typeface="Arial"/>
+                          <a:ea typeface="Arial"/>
+                        </a:rPr>
+                        <a:t>COLUMN_ID_4 </a:t>
+                      </a:r>
+                      <a:r>
+                        <a:rPr b="0" lang="en-US" sz="2400" spc="-1" strike="noStrike">
+                          <a:solidFill>
+                            <a:srgbClr val="595959"/>
+                          </a:solidFill>
+                          <a:latin typeface="Times New Roman"/>
+                          <a:ea typeface="Arial"/>
+                        </a:rPr>
+                        <a:t>4</a:t>
+                      </a:r>
+                      <a:endParaRPr b="0" lang="en-US" sz="2400" spc="-1" strike="noStrike">
+                        <a:latin typeface="Arial"/>
+                      </a:endParaRPr>
+                    </a:p>
+                  </a:txBody>
+                  <a:tcPr marL="91080" marR="91080">
+                    <a:lnL w="9360">
+                      <a:solidFill>
+                        <a:srgbClr val="9e9e9e"/>
+                      </a:solidFill>
+                    </a:lnL>
+                    <a:lnR w="9360">
+                      <a:solidFill>
+                        <a:srgbClr val="9e9e9e"/>
+                      </a:solidFill>
+                    </a:lnR>
+                    <a:lnT w="9360">
+                      <a:solidFill>
+                        <a:srgbClr val="9e9e9e"/>
+                      </a:solidFill>
+                    </a:lnT>
+                    <a:lnB w="9360">
+                      <a:solidFill>
+                        <a:srgbClr val="9e9e9e"/>
+                      </a:solidFill>
+                    </a:lnB>
+                    <a:noFill/>
+                  </a:tcPr>
+                </a:tc>
+                <a:tc>
+                  <a:txBody>
+                    <a:bodyPr lIns="91080" rIns="91080"/>
+                    <a:p>
+                      <a:pPr>
+                        <a:lnSpc>
+                          <a:spcPct val="100000"/>
+                        </a:lnSpc>
+                      </a:pPr>
+                      <a:r>
+                        <a:rPr b="0" lang="en-US" sz="2400" spc="-1" strike="noStrike">
+                          <a:latin typeface="Times New Roman"/>
+                        </a:rPr>
+                        <a:t>5</a:t>
+                      </a:r>
+                      <a:endParaRPr b="0" lang="en-US" sz="2400" spc="-1" strike="noStrike">
+                        <a:latin typeface="Arial"/>
+                      </a:endParaRPr>
+                    </a:p>
+                  </a:txBody>
+                  <a:tcPr marL="91080" marR="91080">
+                    <a:lnL w="9360">
+                      <a:solidFill>
+                        <a:srgbClr val="9e9e9e"/>
+                      </a:solidFill>
+                    </a:lnL>
+                    <a:lnR w="9360">
+                      <a:solidFill>
+                        <a:srgbClr val="9e9e9e"/>
+                      </a:solidFill>
+                    </a:lnR>
+                    <a:lnT w="9360">
+                      <a:solidFill>
+                        <a:srgbClr val="9e9e9e"/>
+                      </a:solidFill>
+                    </a:lnT>
+                    <a:lnB w="9360">
+                      <a:solidFill>
+                        <a:srgbClr val="9e9e9e"/>
+                      </a:solidFill>
+                    </a:lnB>
+                    <a:noFill/>
+                  </a:tcPr>
+                </a:tc>
+              </a:tr>
+              <a:tr h="519480">
+                <a:tc>
+                  <a:txBody>
+                    <a:bodyPr lIns="91080" rIns="91080"/>
+                    <a:p>
+                      <a:pPr>
+                        <a:lnSpc>
+                          <a:spcPct val="100000"/>
+                        </a:lnSpc>
+                      </a:pPr>
+                      <a:r>
+                        <a:rPr b="0" lang="en-US" sz="2400" spc="-1" strike="noStrike">
+                          <a:latin typeface="Times New Roman"/>
+                        </a:rPr>
+                        <a:t>11</a:t>
+                      </a:r>
+                      <a:endParaRPr b="0" lang="en-US" sz="2400" spc="-1" strike="noStrike">
+                        <a:latin typeface="Arial"/>
+                      </a:endParaRPr>
+                    </a:p>
+                  </a:txBody>
+                  <a:tcPr marL="91080" marR="91080">
+                    <a:lnL w="9360">
+                      <a:solidFill>
+                        <a:srgbClr val="9e9e9e"/>
+                      </a:solidFill>
+                    </a:lnL>
+                    <a:lnR w="9360">
+                      <a:solidFill>
+                        <a:srgbClr val="9e9e9e"/>
+                      </a:solidFill>
+                    </a:lnR>
+                    <a:lnT w="9360">
+                      <a:solidFill>
+                        <a:srgbClr val="9e9e9e"/>
+                      </a:solidFill>
+                    </a:lnT>
+                    <a:lnB w="9360">
+                      <a:solidFill>
+                        <a:srgbClr val="9e9e9e"/>
+                      </a:solidFill>
+                    </a:lnB>
+                    <a:noFill/>
+                  </a:tcPr>
+                </a:tc>
+                <a:tc>
+                  <a:txBody>
+                    <a:bodyPr lIns="91080" rIns="91080"/>
+                    <a:p>
+                      <a:pPr>
+                        <a:lnSpc>
+                          <a:spcPct val="100000"/>
+                        </a:lnSpc>
+                      </a:pPr>
+                      <a:r>
+                        <a:rPr b="0" lang="en-US" sz="2400" spc="-1" strike="noStrike">
+                          <a:latin typeface="Times New Roman"/>
+                        </a:rPr>
+                        <a:t>12</a:t>
+                      </a:r>
+                      <a:endParaRPr b="0" lang="en-US" sz="2400" spc="-1" strike="noStrike">
+                        <a:latin typeface="Arial"/>
+                      </a:endParaRPr>
+                    </a:p>
+                  </a:txBody>
+                  <a:tcPr marL="91080" marR="91080">
+                    <a:lnL w="9360">
+                      <a:solidFill>
+                        <a:srgbClr val="9e9e9e"/>
+                      </a:solidFill>
+                    </a:lnL>
+                    <a:lnR w="9360">
+                      <a:solidFill>
+                        <a:srgbClr val="9e9e9e"/>
+                      </a:solidFill>
+                    </a:lnR>
+                    <a:lnT w="9360">
+                      <a:solidFill>
+                        <a:srgbClr val="9e9e9e"/>
+                      </a:solidFill>
+                    </a:lnT>
+                    <a:lnB w="9360">
+                      <a:solidFill>
+                        <a:srgbClr val="9e9e9e"/>
+                      </a:solidFill>
+                    </a:lnB>
+                    <a:noFill/>
+                  </a:tcPr>
+                </a:tc>
+                <a:tc>
+                  <a:txBody>
+                    <a:bodyPr lIns="91080" rIns="91080"/>
+                    <a:p>
+                      <a:pPr>
+                        <a:lnSpc>
+                          <a:spcPct val="100000"/>
+                        </a:lnSpc>
+                      </a:pPr>
+                      <a:r>
+                        <a:rPr b="0" lang="en-US" sz="2400" spc="-1" strike="noStrike">
+                          <a:latin typeface="Times New Roman"/>
+                        </a:rPr>
+                        <a:t>13</a:t>
+                      </a:r>
+                      <a:endParaRPr b="0" lang="en-US" sz="2400" spc="-1" strike="noStrike">
+                        <a:latin typeface="Arial"/>
+                      </a:endParaRPr>
+                    </a:p>
+                  </a:txBody>
+                  <a:tcPr marL="91080" marR="91080">
+                    <a:lnL w="9360">
+                      <a:solidFill>
+                        <a:srgbClr val="9e9e9e"/>
+                      </a:solidFill>
+                    </a:lnL>
+                    <a:lnR w="9360">
+                      <a:solidFill>
+                        <a:srgbClr val="9e9e9e"/>
+                      </a:solidFill>
+                    </a:lnR>
+                    <a:lnT w="9360">
+                      <a:solidFill>
+                        <a:srgbClr val="9e9e9e"/>
+                      </a:solidFill>
+                    </a:lnT>
+                    <a:lnB w="9360">
+                      <a:solidFill>
+                        <a:srgbClr val="9e9e9e"/>
+                      </a:solidFill>
+                    </a:lnB>
+                    <a:noFill/>
+                  </a:tcPr>
+                </a:tc>
+                <a:tc>
+                  <a:txBody>
+                    <a:bodyPr lIns="91080" rIns="91080"/>
+                    <a:p>
+                      <a:pPr>
+                        <a:lnSpc>
+                          <a:spcPct val="100000"/>
+                        </a:lnSpc>
+                      </a:pPr>
+                      <a:r>
+                        <a:rPr b="0" lang="en-US" sz="2400" spc="-1" strike="noStrike">
+                          <a:latin typeface="Times New Roman"/>
+                        </a:rPr>
+                        <a:t>14</a:t>
+                      </a:r>
+                      <a:endParaRPr b="0" lang="en-US" sz="2400" spc="-1" strike="noStrike">
+                        <a:latin typeface="Arial"/>
+                      </a:endParaRPr>
+                    </a:p>
+                  </a:txBody>
+                  <a:tcPr marL="91080" marR="91080">
+                    <a:lnL w="9360">
+                      <a:solidFill>
+                        <a:srgbClr val="9e9e9e"/>
+                      </a:solidFill>
+                    </a:lnL>
+                    <a:lnR w="9360">
+                      <a:solidFill>
+                        <a:srgbClr val="9e9e9e"/>
+                      </a:solidFill>
+                    </a:lnR>
+                    <a:lnT w="9360">
+                      <a:solidFill>
+                        <a:srgbClr val="9e9e9e"/>
+                      </a:solidFill>
+                    </a:lnT>
+                    <a:lnB w="9360">
+                      <a:solidFill>
+                        <a:srgbClr val="9e9e9e"/>
+                      </a:solidFill>
+                    </a:lnB>
+                    <a:noFill/>
+                  </a:tcPr>
+                </a:tc>
+                <a:tc>
+                  <a:txBody>
+                    <a:bodyPr lIns="91080" rIns="91080"/>
+                    <a:p>
+                      <a:pPr>
+                        <a:lnSpc>
+                          <a:spcPct val="100000"/>
+                        </a:lnSpc>
+                      </a:pPr>
+                      <a:r>
+                        <a:rPr b="0" lang="en-US" sz="2400" spc="-1" strike="noStrike">
+                          <a:latin typeface="Times New Roman"/>
+                        </a:rPr>
+                        <a:t>15</a:t>
+                      </a:r>
+                      <a:endParaRPr b="0" lang="en-US" sz="2400" spc="-1" strike="noStrike">
+                        <a:latin typeface="Arial"/>
+                      </a:endParaRPr>
+                    </a:p>
+                  </a:txBody>
+                  <a:tcPr marL="91080" marR="91080">
+                    <a:lnL w="9360">
+                      <a:solidFill>
+                        <a:srgbClr val="9e9e9e"/>
+                      </a:solidFill>
+                    </a:lnL>
+                    <a:lnR w="9360">
+                      <a:solidFill>
+                        <a:srgbClr val="9e9e9e"/>
+                      </a:solidFill>
+                    </a:lnR>
+                    <a:lnT w="9360">
+                      <a:solidFill>
+                        <a:srgbClr val="9e9e9e"/>
+                      </a:solidFill>
+                    </a:lnT>
+                    <a:lnB w="9360">
+                      <a:solidFill>
+                        <a:srgbClr val="9e9e9e"/>
+                      </a:solidFill>
+                    </a:lnB>
+                    <a:noFill/>
+                  </a:tcPr>
+                </a:tc>
+              </a:tr>
+              <a:tr h="519480">
+                <a:tc>
+                  <a:txBody>
+                    <a:bodyPr lIns="91080" rIns="91080"/>
+                    <a:p>
+                      <a:pPr>
+                        <a:lnSpc>
+                          <a:spcPct val="100000"/>
+                        </a:lnSpc>
+                      </a:pPr>
+                      <a:r>
+                        <a:rPr b="0" lang="en-US" sz="1800" spc="-1" strike="noStrike">
+                          <a:solidFill>
+                            <a:srgbClr val="595959"/>
+                          </a:solidFill>
+                          <a:latin typeface="Arial"/>
+                          <a:ea typeface="Arial"/>
+                        </a:rPr>
+                        <a:t>21 </a:t>
+                      </a:r>
+                      <a:endParaRPr b="0" lang="en-US" sz="1800" spc="-1" strike="noStrike">
+                        <a:latin typeface="Arial"/>
+                      </a:endParaRPr>
+                    </a:p>
+                  </a:txBody>
+                  <a:tcPr marL="91080" marR="91080">
+                    <a:lnL w="9360">
+                      <a:solidFill>
+                        <a:srgbClr val="9e9e9e"/>
+                      </a:solidFill>
+                    </a:lnL>
+                    <a:lnR w="9360">
+                      <a:solidFill>
+                        <a:srgbClr val="9e9e9e"/>
+                      </a:solidFill>
+                    </a:lnR>
+                    <a:lnT w="9360">
+                      <a:solidFill>
+                        <a:srgbClr val="9e9e9e"/>
+                      </a:solidFill>
+                    </a:lnT>
+                    <a:lnB w="9360">
+                      <a:solidFill>
+                        <a:srgbClr val="9e9e9e"/>
+                      </a:solidFill>
+                    </a:lnB>
+                    <a:noFill/>
+                  </a:tcPr>
+                </a:tc>
+                <a:tc>
+                  <a:txBody>
+                    <a:bodyPr lIns="91080" rIns="91080"/>
+                    <a:p>
+                      <a:pPr>
+                        <a:lnSpc>
+                          <a:spcPct val="100000"/>
+                        </a:lnSpc>
+                      </a:pPr>
+                      <a:r>
+                        <a:rPr b="0" lang="en-US" sz="2400" spc="-1" strike="noStrike">
+                          <a:latin typeface="Times New Roman"/>
+                        </a:rPr>
+                        <a:t>22</a:t>
+                      </a:r>
+                      <a:endParaRPr b="0" lang="en-US" sz="2400" spc="-1" strike="noStrike">
+                        <a:latin typeface="Arial"/>
+                      </a:endParaRPr>
+                    </a:p>
+                  </a:txBody>
+                  <a:tcPr marL="91080" marR="91080">
+                    <a:lnL w="9360">
+                      <a:solidFill>
+                        <a:srgbClr val="9e9e9e"/>
+                      </a:solidFill>
+                    </a:lnL>
+                    <a:lnR w="9360">
+                      <a:solidFill>
+                        <a:srgbClr val="9e9e9e"/>
+                      </a:solidFill>
+                    </a:lnR>
+                    <a:lnT w="9360">
+                      <a:solidFill>
+                        <a:srgbClr val="9e9e9e"/>
+                      </a:solidFill>
+                    </a:lnT>
+                    <a:lnB w="9360">
+                      <a:solidFill>
+                        <a:srgbClr val="9e9e9e"/>
+                      </a:solidFill>
+                    </a:lnB>
+                    <a:noFill/>
+                  </a:tcPr>
+                </a:tc>
+                <a:tc>
+                  <a:txBody>
+                    <a:bodyPr lIns="91080" rIns="91080"/>
+                    <a:p>
+                      <a:pPr>
+                        <a:lnSpc>
+                          <a:spcPct val="100000"/>
+                        </a:lnSpc>
+                      </a:pPr>
+                      <a:r>
+                        <a:rPr b="0" lang="en-US" sz="2400" spc="-1" strike="noStrike">
+                          <a:latin typeface="Times New Roman"/>
+                        </a:rPr>
+                        <a:t>23</a:t>
+                      </a:r>
+                      <a:endParaRPr b="0" lang="en-US" sz="2400" spc="-1" strike="noStrike">
+                        <a:latin typeface="Arial"/>
+                      </a:endParaRPr>
+                    </a:p>
+                  </a:txBody>
+                  <a:tcPr marL="91080" marR="91080">
+                    <a:lnL w="9360">
+                      <a:solidFill>
+                        <a:srgbClr val="9e9e9e"/>
+                      </a:solidFill>
+                    </a:lnL>
+                    <a:lnR w="9360">
+                      <a:solidFill>
+                        <a:srgbClr val="9e9e9e"/>
+                      </a:solidFill>
+                    </a:lnR>
+                    <a:lnT w="9360">
+                      <a:solidFill>
+                        <a:srgbClr val="9e9e9e"/>
+                      </a:solidFill>
+                    </a:lnT>
+                    <a:lnB w="9360">
+                      <a:solidFill>
+                        <a:srgbClr val="9e9e9e"/>
+                      </a:solidFill>
+                    </a:lnB>
+                    <a:noFill/>
+                  </a:tcPr>
+                </a:tc>
+                <a:tc>
+                  <a:txBody>
+                    <a:bodyPr lIns="91080" rIns="91080"/>
+                    <a:p>
+                      <a:pPr>
+                        <a:lnSpc>
+                          <a:spcPct val="100000"/>
+                        </a:lnSpc>
+                      </a:pPr>
+                      <a:r>
+                        <a:rPr b="0" lang="en-US" sz="2400" spc="-1" strike="noStrike">
+                          <a:latin typeface="Times New Roman"/>
+                        </a:rPr>
+                        <a:t>24</a:t>
+                      </a:r>
+                      <a:endParaRPr b="0" lang="en-US" sz="2400" spc="-1" strike="noStrike">
+                        <a:latin typeface="Arial"/>
+                      </a:endParaRPr>
+                    </a:p>
+                  </a:txBody>
+                  <a:tcPr marL="91080" marR="91080">
+                    <a:lnL w="9360">
+                      <a:solidFill>
+                        <a:srgbClr val="9e9e9e"/>
+                      </a:solidFill>
+                    </a:lnL>
+                    <a:lnR w="9360">
+                      <a:solidFill>
+                        <a:srgbClr val="9e9e9e"/>
+                      </a:solidFill>
+                    </a:lnR>
+                    <a:lnT w="9360">
+                      <a:solidFill>
+                        <a:srgbClr val="9e9e9e"/>
+                      </a:solidFill>
+                    </a:lnT>
+                    <a:lnB w="9360">
+                      <a:solidFill>
+                        <a:srgbClr val="9e9e9e"/>
+                      </a:solidFill>
+                    </a:lnB>
+                    <a:noFill/>
+                  </a:tcPr>
+                </a:tc>
+                <a:tc>
+                  <a:txBody>
+                    <a:bodyPr lIns="91080" rIns="91080"/>
+                    <a:p>
+                      <a:pPr>
+                        <a:lnSpc>
+                          <a:spcPct val="100000"/>
+                        </a:lnSpc>
+                      </a:pPr>
+                      <a:r>
+                        <a:rPr b="0" lang="en-US" sz="2400" spc="-1" strike="noStrike">
+                          <a:latin typeface="Times New Roman"/>
+                        </a:rPr>
+                        <a:t>25</a:t>
+                      </a:r>
+                      <a:endParaRPr b="0" lang="en-US" sz="2400" spc="-1" strike="noStrike">
+                        <a:latin typeface="Arial"/>
+                      </a:endParaRPr>
+                    </a:p>
+                  </a:txBody>
+                  <a:tcPr marL="91080" marR="91080">
+                    <a:lnL w="9360">
+                      <a:solidFill>
+                        <a:srgbClr val="9e9e9e"/>
+                      </a:solidFill>
+                    </a:lnL>
+                    <a:lnR w="9360">
+                      <a:solidFill>
+                        <a:srgbClr val="9e9e9e"/>
+                      </a:solidFill>
+                    </a:lnR>
+                    <a:lnT w="9360">
+                      <a:solidFill>
+                        <a:srgbClr val="9e9e9e"/>
+                      </a:solidFill>
+                    </a:lnT>
+                    <a:lnB w="9360">
+                      <a:solidFill>
+                        <a:srgbClr val="9e9e9e"/>
+                      </a:solidFill>
+                    </a:lnB>
+                    <a:noFill/>
+                  </a:tcPr>
+                </a:tc>
+              </a:tr>
+              <a:tr h="519480">
+                <a:tc>
+                  <a:txBody>
+                    <a:bodyPr lIns="91080" rIns="91080"/>
+                    <a:p>
+                      <a:pPr>
+                        <a:lnSpc>
+                          <a:spcPct val="100000"/>
+                        </a:lnSpc>
+                      </a:pPr>
+                      <a:r>
+                        <a:rPr b="0" lang="en-US" sz="2400" spc="-1" strike="noStrike">
+                          <a:latin typeface="Times New Roman"/>
+                        </a:rPr>
+                        <a:t>31</a:t>
+                      </a:r>
+                      <a:endParaRPr b="0" lang="en-US" sz="2400" spc="-1" strike="noStrike">
+                        <a:latin typeface="Arial"/>
+                      </a:endParaRPr>
+                    </a:p>
+                  </a:txBody>
+                  <a:tcPr marL="91080" marR="91080">
+                    <a:lnL w="9360">
+                      <a:solidFill>
+                        <a:srgbClr val="9e9e9e"/>
+                      </a:solidFill>
+                    </a:lnL>
+                    <a:lnR w="9360">
+                      <a:solidFill>
+                        <a:srgbClr val="9e9e9e"/>
+                      </a:solidFill>
+                    </a:lnR>
+                    <a:lnT w="9360">
+                      <a:solidFill>
+                        <a:srgbClr val="9e9e9e"/>
+                      </a:solidFill>
+                    </a:lnT>
+                    <a:lnB w="9360">
+                      <a:solidFill>
+                        <a:srgbClr val="9e9e9e"/>
+                      </a:solidFill>
+                    </a:lnB>
+                    <a:noFill/>
+                  </a:tcPr>
+                </a:tc>
+                <a:tc>
+                  <a:txBody>
+                    <a:bodyPr lIns="91080" rIns="91080"/>
+                    <a:p>
+                      <a:pPr>
+                        <a:lnSpc>
+                          <a:spcPct val="100000"/>
+                        </a:lnSpc>
+                      </a:pPr>
+                      <a:r>
+                        <a:rPr b="0" lang="en-US" sz="2400" spc="-1" strike="noStrike">
+                          <a:latin typeface="Times New Roman"/>
+                        </a:rPr>
+                        <a:t>32</a:t>
+                      </a:r>
+                      <a:endParaRPr b="0" lang="en-US" sz="2400" spc="-1" strike="noStrike">
+                        <a:latin typeface="Arial"/>
+                      </a:endParaRPr>
+                    </a:p>
+                  </a:txBody>
+                  <a:tcPr marL="91080" marR="91080">
+                    <a:lnL w="9360">
+                      <a:solidFill>
+                        <a:srgbClr val="9e9e9e"/>
+                      </a:solidFill>
+                    </a:lnL>
+                    <a:lnR w="9360">
+                      <a:solidFill>
+                        <a:srgbClr val="9e9e9e"/>
+                      </a:solidFill>
+                    </a:lnR>
+                    <a:lnT w="9360">
+                      <a:solidFill>
+                        <a:srgbClr val="9e9e9e"/>
+                      </a:solidFill>
+                    </a:lnT>
+                    <a:lnB w="9360">
+                      <a:solidFill>
+                        <a:srgbClr val="9e9e9e"/>
+                      </a:solidFill>
+                    </a:lnB>
+                    <a:noFill/>
+                  </a:tcPr>
+                </a:tc>
+                <a:tc>
+                  <a:txBody>
+                    <a:bodyPr lIns="91080" rIns="91080"/>
+                    <a:p>
+                      <a:pPr>
+                        <a:lnSpc>
+                          <a:spcPct val="100000"/>
+                        </a:lnSpc>
+                      </a:pPr>
+                      <a:r>
+                        <a:rPr b="0" lang="en-US" sz="2400" spc="-1" strike="noStrike">
+                          <a:latin typeface="Times New Roman"/>
+                        </a:rPr>
+                        <a:t>33</a:t>
+                      </a:r>
+                      <a:endParaRPr b="0" lang="en-US" sz="2400" spc="-1" strike="noStrike">
+                        <a:latin typeface="Arial"/>
+                      </a:endParaRPr>
+                    </a:p>
+                  </a:txBody>
+                  <a:tcPr marL="91080" marR="91080">
+                    <a:lnL w="9360">
+                      <a:solidFill>
+                        <a:srgbClr val="9e9e9e"/>
+                      </a:solidFill>
+                    </a:lnL>
+                    <a:lnR w="9360">
+                      <a:solidFill>
+                        <a:srgbClr val="9e9e9e"/>
+                      </a:solidFill>
+                    </a:lnR>
+                    <a:lnT w="9360">
+                      <a:solidFill>
+                        <a:srgbClr val="9e9e9e"/>
+                      </a:solidFill>
+                    </a:lnT>
+                    <a:lnB w="9360">
+                      <a:solidFill>
+                        <a:srgbClr val="9e9e9e"/>
+                      </a:solidFill>
+                    </a:lnB>
+                    <a:noFill/>
+                  </a:tcPr>
+                </a:tc>
+                <a:tc>
+                  <a:txBody>
+                    <a:bodyPr lIns="91080" rIns="91080"/>
+                    <a:p>
+                      <a:pPr>
+                        <a:lnSpc>
+                          <a:spcPct val="100000"/>
+                        </a:lnSpc>
+                      </a:pPr>
+                      <a:r>
+                        <a:rPr b="0" lang="en-US" sz="2400" spc="-1" strike="noStrike">
+                          <a:latin typeface="Times New Roman"/>
+                        </a:rPr>
+                        <a:t>34</a:t>
+                      </a:r>
+                      <a:endParaRPr b="0" lang="en-US" sz="2400" spc="-1" strike="noStrike">
+                        <a:latin typeface="Arial"/>
+                      </a:endParaRPr>
+                    </a:p>
+                  </a:txBody>
+                  <a:tcPr marL="91080" marR="91080">
+                    <a:lnL w="9360">
+                      <a:solidFill>
+                        <a:srgbClr val="9e9e9e"/>
+                      </a:solidFill>
+                    </a:lnL>
+                    <a:lnR w="9360">
+                      <a:solidFill>
+                        <a:srgbClr val="9e9e9e"/>
+                      </a:solidFill>
+                    </a:lnR>
+                    <a:lnT w="9360">
+                      <a:solidFill>
+                        <a:srgbClr val="9e9e9e"/>
+                      </a:solidFill>
+                    </a:lnT>
+                    <a:lnB w="9360">
+                      <a:solidFill>
+                        <a:srgbClr val="9e9e9e"/>
+                      </a:solidFill>
+                    </a:lnB>
+                    <a:noFill/>
+                  </a:tcPr>
+                </a:tc>
+                <a:tc>
+                  <a:txBody>
+                    <a:bodyPr lIns="91080" rIns="91080"/>
+                    <a:p>
+                      <a:pPr>
+                        <a:lnSpc>
+                          <a:spcPct val="100000"/>
+                        </a:lnSpc>
+                      </a:pPr>
+                      <a:r>
+                        <a:rPr b="0" lang="en-US" sz="1800" spc="-1" strike="noStrike">
+                          <a:latin typeface="Arial"/>
+                        </a:rPr>
+                        <a:t>35</a:t>
+                      </a:r>
+                      <a:endParaRPr b="0" lang="en-US" sz="1800" spc="-1" strike="noStrike">
+                        <a:latin typeface="Arial"/>
+                      </a:endParaRPr>
+                    </a:p>
+                  </a:txBody>
+                  <a:tcPr marL="91080" marR="91080">
+                    <a:lnL w="9360">
+                      <a:solidFill>
+                        <a:srgbClr val="9e9e9e"/>
+                      </a:solidFill>
+                    </a:lnL>
+                    <a:lnR w="9360">
+                      <a:solidFill>
+                        <a:srgbClr val="9e9e9e"/>
+                      </a:solidFill>
+                    </a:lnR>
+                    <a:lnT w="9360">
+                      <a:solidFill>
+                        <a:srgbClr val="9e9e9e"/>
+                      </a:solidFill>
+                    </a:lnT>
+                    <a:lnB w="9360">
+                      <a:solidFill>
+                        <a:srgbClr val="9e9e9e"/>
+                      </a:solidFill>
+                    </a:lnB>
+                    <a:noFill/>
+                  </a:tcPr>
+                </a:tc>
+              </a:tr>
+            </a:tbl>
+          </a:graphicData>
+        </a:graphic>
+      </p:graphicFrame>
     </p:spTree>
   </p:cSld>
   <p:timing>
@@ -5050,14 +7121,14 @@
       </p:grpSpPr>
       <p:sp>
         <p:nvSpPr>
-          <p:cNvPr id="88" name="CustomShape 1"/>
+          <p:cNvPr id="90" name="CustomShape 1"/>
           <p:cNvSpPr/>
           <p:nvPr/>
         </p:nvSpPr>
         <p:spPr>
           <a:xfrm>
-            <a:off x="640080" y="640080"/>
-            <a:ext cx="7943760" cy="334800"/>
+            <a:off x="311760" y="444960"/>
+            <a:ext cx="8505720" cy="558000"/>
           </a:xfrm>
           <a:prstGeom prst="rect">
             <a:avLst/>
@@ -5073,17 +7144,42 @@
           <a:effectRef idx="0"/>
           <a:fontRef idx="minor"/>
         </p:style>
-      </p:sp>
-      <p:sp>
-        <p:nvSpPr>
-          <p:cNvPr id="89" name="CustomShape 2"/>
+        <p:txBody>
+          <a:bodyPr lIns="90000" rIns="90000" tIns="91440" bIns="91440">
+            <a:normAutofit/>
+          </a:bodyPr>
+          <a:p>
+            <a:pPr>
+              <a:lnSpc>
+                <a:spcPct val="100000"/>
+              </a:lnSpc>
+            </a:pPr>
+            <a:r>
+              <a:rPr b="0" lang="en-US" sz="2800" spc="-1" strike="noStrike">
+                <a:solidFill>
+                  <a:srgbClr val="000000"/>
+                </a:solidFill>
+                <a:latin typeface="Arial"/>
+                <a:ea typeface="Arial"/>
+              </a:rPr>
+              <a:t>+++INS sample_name +++</a:t>
+            </a:r>
+            <a:endParaRPr b="0" lang="en-US" sz="2800" spc="-1" strike="noStrike">
+              <a:latin typeface="Arial"/>
+            </a:endParaRPr>
+          </a:p>
+        </p:txBody>
+      </p:sp>
+      <p:sp>
+        <p:nvSpPr>
+          <p:cNvPr id="91" name="CustomShape 2"/>
           <p:cNvSpPr/>
           <p:nvPr/>
         </p:nvSpPr>
         <p:spPr>
           <a:xfrm>
             <a:off x="311760" y="1152360"/>
-            <a:ext cx="8507160" cy="3403080"/>
+            <a:ext cx="8505720" cy="3401640"/>
           </a:xfrm>
           <a:prstGeom prst="rect">
             <a:avLst/>
@@ -5108,6 +7204,9 @@
               <a:lnSpc>
                 <a:spcPct val="115000"/>
               </a:lnSpc>
+              <a:spcBef>
+                <a:spcPts val="1199"/>
+              </a:spcBef>
               <a:spcAft>
                 <a:spcPts val="1199"/>
               </a:spcAft>
@@ -5120,7 +7219,29 @@
                 <a:latin typeface="Arial"/>
                 <a:ea typeface="Arial"/>
               </a:rPr>
-              <a:t>+++ EXTRA_SLIDE +++</a:t>
+              <a:t>+++FOR ((SAMPLE_DATA_1))&lt;&lt; +++INS NAME +++  +++INS AGE +++&gt;&gt; FOR-END+++</a:t>
+            </a:r>
+            <a:br/>
+            <a:r>
+              <a:rPr b="0" lang="en-US" sz="1800" spc="-1" strike="noStrike">
+                <a:solidFill>
+                  <a:srgbClr val="595959"/>
+                </a:solidFill>
+                <a:latin typeface="Arial"/>
+                <a:ea typeface="Arial"/>
+              </a:rPr>
+              <a:t>+++FOR ((SAMPLE_DATA_2))&lt;&lt; +++INS NAME +++   +++INS AGE +++ &gt;&gt; FOR-END+++</a:t>
+            </a:r>
+            <a:br/>
+            <a:r>
+              <a:rPr b="0" lang="en-US" sz="1800" spc="-1" strike="noStrike">
+                <a:solidFill>
+                  <a:srgbClr val="595959"/>
+                </a:solidFill>
+                <a:latin typeface="Arial"/>
+                <a:ea typeface="Arial"/>
+              </a:rPr>
+              <a:t>+++FOR ((SAMPLE_DATA_3))&lt;&lt; +++INS NAME +++    +++INS AGE +++ &gt;&gt; FOR-END+++</a:t>
             </a:r>
             <a:endParaRPr b="0" lang="en-US" sz="1800" spc="-1" strike="noStrike">
               <a:latin typeface="Arial"/>
@@ -5179,14 +7300,40 @@
       </p:grpSpPr>
       <p:sp>
         <p:nvSpPr>
-          <p:cNvPr id="90" name="CustomShape 1"/>
+          <p:cNvPr id="92" name="CustomShape 1"/>
           <p:cNvSpPr/>
           <p:nvPr/>
         </p:nvSpPr>
         <p:spPr>
           <a:xfrm>
+            <a:off x="311760" y="444960"/>
+            <a:ext cx="8505720" cy="558000"/>
+          </a:xfrm>
+          <a:prstGeom prst="rect">
+            <a:avLst/>
+          </a:prstGeom>
+          <a:noFill/>
+          <a:ln>
+            <a:noFill/>
+          </a:ln>
+        </p:spPr>
+        <p:style>
+          <a:lnRef idx="0"/>
+          <a:fillRef idx="0"/>
+          <a:effectRef idx="0"/>
+          <a:fontRef idx="minor"/>
+        </p:style>
+      </p:sp>
+      <p:sp>
+        <p:nvSpPr>
+          <p:cNvPr id="93" name="CustomShape 2"/>
+          <p:cNvSpPr/>
+          <p:nvPr/>
+        </p:nvSpPr>
+        <p:spPr>
+          <a:xfrm>
             <a:off x="311760" y="1152360"/>
-            <a:ext cx="8507160" cy="3403080"/>
+            <a:ext cx="8505720" cy="3401640"/>
           </a:xfrm>
           <a:prstGeom prst="rect">
             <a:avLst/>
@@ -5223,7 +7370,7 @@
                 <a:latin typeface="Arial"/>
                 <a:ea typeface="Arial"/>
               </a:rPr>
-              <a:t>+++ EXTRA_SLIDE +++</a:t>
+              <a:t>+++TABLE_ADD cashFlows +++</a:t>
             </a:r>
             <a:endParaRPr b="0" lang="en-US" sz="1800" spc="-1" strike="noStrike">
               <a:latin typeface="Arial"/>
@@ -5282,14 +7429,40 @@
       </p:grpSpPr>
       <p:sp>
         <p:nvSpPr>
-          <p:cNvPr id="91" name="CustomShape 1"/>
+          <p:cNvPr id="94" name="CustomShape 1"/>
           <p:cNvSpPr/>
           <p:nvPr/>
         </p:nvSpPr>
         <p:spPr>
           <a:xfrm>
+            <a:off x="640080" y="640080"/>
+            <a:ext cx="7942320" cy="333360"/>
+          </a:xfrm>
+          <a:prstGeom prst="rect">
+            <a:avLst/>
+          </a:prstGeom>
+          <a:noFill/>
+          <a:ln>
+            <a:noFill/>
+          </a:ln>
+        </p:spPr>
+        <p:style>
+          <a:lnRef idx="0"/>
+          <a:fillRef idx="0"/>
+          <a:effectRef idx="0"/>
+          <a:fontRef idx="minor"/>
+        </p:style>
+      </p:sp>
+      <p:sp>
+        <p:nvSpPr>
+          <p:cNvPr id="95" name="CustomShape 2"/>
+          <p:cNvSpPr/>
+          <p:nvPr/>
+        </p:nvSpPr>
+        <p:spPr>
+          <a:xfrm>
             <a:off x="311760" y="1152360"/>
-            <a:ext cx="8507160" cy="3403080"/>
+            <a:ext cx="8505720" cy="3401640"/>
           </a:xfrm>
           <a:prstGeom prst="rect">
             <a:avLst/>

</xml_diff>